<commit_message>
lesson plans are appearing on the worksheet and powerpoint slides these have been broken up into seperate parts
</commit_message>
<xml_diff>
--- a/public/presentations/presentation.pptx
+++ b/public/presentations/presentation.pptx
@@ -162,7 +162,7 @@
   </p:cSld>
   <p:clrMap bg1="lt1" tx1="dk1" bg2="lt2" tx2="dk2" accent1="accent1" accent2="accent2" accent3="accent3" accent4="accent4" accent5="accent5" accent6="accent6" hlink="hlink" folHlink="folHlink"/>
   <p:sldLayoutIdLst>
-    <p:sldLayoutId id="2374134716" r:id="rId1"/>
+    <p:sldLayoutId id="2374322381" r:id="rId1"/>
   </p:sldLayoutIdLst>
   <p:txStyles>
     <p:titleStyle>
@@ -281,12 +281,23 @@
                 </a:solidFill>
                 <a:latin typeface="Calibri"/>
               </a:rPr>
-              <a:t><![CDATA[Sure, here are five problem-solving questions aimed at Year 7 pupils on solving equations:
-1. John has 12 toy cars and wants to give some to his friend. If he gives away x toy cars, how many will he have left?
-2. If Sarah has 50 stickers and she gives away 10 to her friend, how many stickers will she have left? Write an equation to solve the problem.
-3. A group of 8 friends want to share a pizza equally. How much pizza will each of them get? Write an equation to solve the problem.
-4. A recipe calls for 1 cup of sugar to make 12 muffins. How much sugar will you need to make 24 muffins? Write an equation to solve the problem.
-5. If a student has -5 marks in a test and she gains x marks, what will be her overall result? Write an equation to solve the problem.]]></a:t>
+              <a:t><![CDATA[1: Introduction to Expanding Brackets and Quadratic Expressions
+Objective: Students will be able to expand linear expressions and simplify quadratic expressions.
+Recap activity: Distribute a worksheet with 5-10 problems from previous lessons on simplifying linear expressions.
+Teaching: 
+- Introduce the concept of expanding brackets and show how it relates to quadratic expressions. 
+- Demonstrate how to expand linear expressions using the distributive property. 
+- Provide examples of expanding quadratic expressions by multiplying two binomials using FOIL rule. 
+Practice:
+- Students will practice expanding linear expressions and simplifying quadratic expressions by using worksheets
+- Use a collaborative whiteboard platform for a classwork assignment, where students can work together and share their answers.
+Exit ticket: What is the quadratic expression (x + 2)^2 after expanding the brackets? Provide a step-by-step explanation. 
+Worksheet:
+1. Expand the following expression: 2(x+3)
+2. Simplify the following quadratic expression: x^2 + 5x + 6
+3. Expand the following expression: (2x - 3)(x + 4)
+4. Simplify the following quadratic expression: 4x^2 + 2x - 6
+5. Expand the following expression: (5x - 1)(x - 2)]]></a:t>
             </a:r>
           </a:p>
         </p:txBody>
@@ -300,9 +311,9 @@
 </file>
 
 <file path=ppt/theme/theme1.xml><?xml version="1.0" encoding="utf-8"?>
-<a:theme xmlns:a="http://schemas.openxmlformats.org/drawingml/2006/main" name="Theme23">
+<a:theme xmlns:a="http://schemas.openxmlformats.org/drawingml/2006/main" name="Theme66">
   <a:themeElements>
-    <a:clrScheme name="Theme23">
+    <a:clrScheme name="Theme66">
       <a:dk1>
         <a:sysClr val="windowText" lastClr="000000"/>
       </a:dk1>
@@ -340,7 +351,7 @@
         <a:srgbClr val="800080"/>
       </a:folHlink>
     </a:clrScheme>
-    <a:fontScheme name="Theme23">
+    <a:fontScheme name="Theme66">
       <a:majorFont>
         <a:latin typeface="Calibri"/>
         <a:ea typeface=""/>
@@ -410,7 +421,7 @@
         <a:font script="Uigh" typeface="Microsoft Uighur"/>
       </a:minorFont>
     </a:fontScheme>
-    <a:fmtScheme name="Theme23">
+    <a:fmtScheme name="Theme66">
       <a:fillStyleLst>
         <a:solidFill>
           <a:schemeClr val="phClr"/>

</xml_diff>

<commit_message>
create powerpoint slides button has been added and response is added onto the powerpoint
</commit_message>
<xml_diff>
--- a/public/presentations/presentation.pptx
+++ b/public/presentations/presentation.pptx
@@ -162,7 +162,7 @@
   </p:cSld>
   <p:clrMap bg1="lt1" tx1="dk1" bg2="lt2" tx2="dk2" accent1="accent1" accent2="accent2" accent3="accent3" accent4="accent4" accent5="accent5" accent6="accent6" hlink="hlink" folHlink="folHlink"/>
   <p:sldLayoutIdLst>
-    <p:sldLayoutId id="2374322381" r:id="rId1"/>
+    <p:sldLayoutId id="2374662198" r:id="rId1"/>
   </p:sldLayoutIdLst>
   <p:txStyles>
     <p:titleStyle>
@@ -281,23 +281,26 @@
                 </a:solidFill>
                 <a:latin typeface="Calibri"/>
               </a:rPr>
-              <a:t><![CDATA[1: Introduction to Expanding Brackets and Quadratic Expressions
-Objective: Students will be able to expand linear expressions and simplify quadratic expressions.
-Recap activity: Distribute a worksheet with 5-10 problems from previous lessons on simplifying linear expressions.
-Teaching: 
-- Introduce the concept of expanding brackets and show how it relates to quadratic expressions. 
-- Demonstrate how to expand linear expressions using the distributive property. 
-- Provide examples of expanding quadratic expressions by multiplying two binomials using FOIL rule. 
-Practice:
-- Students will practice expanding linear expressions and simplifying quadratic expressions by using worksheets
-- Use a collaborative whiteboard platform for a classwork assignment, where students can work together and share their answers.
-Exit ticket: What is the quadratic expression (x + 2)^2 after expanding the brackets? Provide a step-by-step explanation. 
-Worksheet:
-1. Expand the following expression: 2(x+3)
-2. Simplify the following quadratic expression: x^2 + 5x + 6
-3. Expand the following expression: (2x - 3)(x + 4)
-4. Simplify the following quadratic expression: 4x^2 + 2x - 6
-5. Expand the following expression: (5x - 1)(x - 2)]]></a:t>
+              <a:t><![CDATA[Slide 1: Understanding Multiplying Fractions
+- Objective: Students will understand how to multiply fractions by working through relatable examples, thus building a strong foundation to advance to more complex work.
+Slide 2: Recap Activity
+- What is a fraction?
+- How do you represent multiplication of two fractions?
+- What is the difference between multiplying a whole number and a fraction?
+Slide 3-4: Teaching
+- Revision of fractions concept
+- Explain how to multiply fractions with examples
+- Demonstrate working through examples slowly
+- Provide visual aids like pie charts
+Slide 5-6: Practice
+- Encourage students to work in pairs and groups
+- Answer questions on multiplying fractions from the textbook
+- Assign homework
+Slide 7: Exit Ticket
+- Write two examples of fraction multiplication using denominators of your own choice
+- Explain how to multiply two fractions
+Slide 8-12: Worksheet
+- Contains 10 questions on multiplying fractions, with varying denominators and whole numbers.]]></a:t>
             </a:r>
           </a:p>
         </p:txBody>
@@ -311,9 +314,9 @@
 </file>
 
 <file path=ppt/theme/theme1.xml><?xml version="1.0" encoding="utf-8"?>
-<a:theme xmlns:a="http://schemas.openxmlformats.org/drawingml/2006/main" name="Theme66">
+<a:theme xmlns:a="http://schemas.openxmlformats.org/drawingml/2006/main" name="Theme13">
   <a:themeElements>
-    <a:clrScheme name="Theme66">
+    <a:clrScheme name="Theme13">
       <a:dk1>
         <a:sysClr val="windowText" lastClr="000000"/>
       </a:dk1>
@@ -351,7 +354,7 @@
         <a:srgbClr val="800080"/>
       </a:folHlink>
     </a:clrScheme>
-    <a:fontScheme name="Theme66">
+    <a:fontScheme name="Theme13">
       <a:majorFont>
         <a:latin typeface="Calibri"/>
         <a:ea typeface=""/>
@@ -421,7 +424,7 @@
         <a:font script="Uigh" typeface="Microsoft Uighur"/>
       </a:minorFont>
     </a:fontScheme>
-    <a:fmtScheme name="Theme66">
+    <a:fmtScheme name="Theme13">
       <a:fillStyleLst>
         <a:solidFill>
           <a:schemeClr val="phClr"/>

</xml_diff>

<commit_message>
worksheet end point has been added
</commit_message>
<xml_diff>
--- a/public/presentations/presentation.pptx
+++ b/public/presentations/presentation.pptx
@@ -162,7 +162,7 @@
   </p:cSld>
   <p:clrMap bg1="lt1" tx1="dk1" bg2="lt2" tx2="dk2" accent1="accent1" accent2="accent2" accent3="accent3" accent4="accent4" accent5="accent5" accent6="accent6" hlink="hlink" folHlink="folHlink"/>
   <p:sldLayoutIdLst>
-    <p:sldLayoutId id="2374662198" r:id="rId1"/>
+    <p:sldLayoutId id="2374664177" r:id="rId1"/>
   </p:sldLayoutIdLst>
   <p:txStyles>
     <p:titleStyle>
@@ -281,26 +281,17 @@
                 </a:solidFill>
                 <a:latin typeface="Calibri"/>
               </a:rPr>
-              <a:t><![CDATA[Slide 1: Understanding Multiplying Fractions
-- Objective: Students will understand how to multiply fractions by working through relatable examples, thus building a strong foundation to advance to more complex work.
-Slide 2: Recap Activity
-- What is a fraction?
-- How do you represent multiplication of two fractions?
-- What is the difference between multiplying a whole number and a fraction?
-Slide 3-4: Teaching
-- Revision of fractions concept
-- Explain how to multiply fractions with examples
-- Demonstrate working through examples slowly
-- Provide visual aids like pie charts
-Slide 5-6: Practice
-- Encourage students to work in pairs and groups
-- Answer questions on multiplying fractions from the textbook
-- Assign homework
-Slide 7: Exit Ticket
-- Write two examples of fraction multiplication using denominators of your own choice
-- Explain how to multiply two fractions
-Slide 8-12: Worksheet
-- Contains 10 questions on multiplying fractions, with varying denominators and whole numbers.]]></a:t>
+              <a:t><![CDATA[Sure, here are some suggestions for what to include on each PowerPoint slide:
+Slide 1: Title slide with the lesson title ("Multiplying Mixed Numbers") and any relevant graphics or images
+Slide 2: Objective slide stating the learning objective for the lesson ("Students will be able to multiply mixed numbers accurately.")
+Slide 3: Recap slide with a question prompt asking students to recall their previous knowledge about fractions and how to add and multiply them.
+Slide 4: Teaching slide explaining the steps in multiplying fractions using examples and visual aids.
+Slide 5: Teaching slide providing practical examples of multiplying mixed numbers, such as baking or cooking recipes.
+Slide 6: Teaching slide explaining the steps in multiplying mixed numbers, which involves converting mixed numbers into improper fractions and then multiplying them as usual, with a visual example.
+Slide 7: Practice slide with a worksheet or problem set for students to practice multiplying mixed numbers.
+Slide 8: Practice slide with a real-world scenario for students to apply their knowledge, such as calculating the total area of a rectangular room.
+Slide 9: Exit ticket slide asking students to explain why it's essential to convert mixed numbers to improper fractions before multiplying them.
+Slide 10: Closing slide with any final thoughts or reminders, such as resources for additional practice or homework assignments.]]></a:t>
             </a:r>
           </a:p>
         </p:txBody>
@@ -314,9 +305,9 @@
 </file>
 
 <file path=ppt/theme/theme1.xml><?xml version="1.0" encoding="utf-8"?>
-<a:theme xmlns:a="http://schemas.openxmlformats.org/drawingml/2006/main" name="Theme13">
+<a:theme xmlns:a="http://schemas.openxmlformats.org/drawingml/2006/main" name="Theme76">
   <a:themeElements>
-    <a:clrScheme name="Theme13">
+    <a:clrScheme name="Theme76">
       <a:dk1>
         <a:sysClr val="windowText" lastClr="000000"/>
       </a:dk1>
@@ -354,7 +345,7 @@
         <a:srgbClr val="800080"/>
       </a:folHlink>
     </a:clrScheme>
-    <a:fontScheme name="Theme13">
+    <a:fontScheme name="Theme76">
       <a:majorFont>
         <a:latin typeface="Calibri"/>
         <a:ea typeface=""/>
@@ -424,7 +415,7 @@
         <a:font script="Uigh" typeface="Microsoft Uighur"/>
       </a:minorFont>
     </a:fontScheme>
-    <a:fmtScheme name="Theme13">
+    <a:fmtScheme name="Theme76">
       <a:fillStyleLst>
         <a:solidFill>
           <a:schemeClr val="phClr"/>

</xml_diff>

<commit_message>
styling added to the site and the homepage features including a temporary calender and buttons
</commit_message>
<xml_diff>
--- a/public/presentations/presentation.pptx
+++ b/public/presentations/presentation.pptx
@@ -162,7 +162,7 @@
   </p:cSld>
   <p:clrMap bg1="lt1" tx1="dk1" bg2="lt2" tx2="dk2" accent1="accent1" accent2="accent2" accent3="accent3" accent4="accent4" accent5="accent5" accent6="accent6" hlink="hlink" folHlink="folHlink"/>
   <p:sldLayoutIdLst>
-    <p:sldLayoutId id="2374664177" r:id="rId1"/>
+    <p:sldLayoutId id="2376733750" r:id="rId1"/>
   </p:sldLayoutIdLst>
   <p:txStyles>
     <p:titleStyle>
@@ -281,17 +281,29 @@
                 </a:solidFill>
                 <a:latin typeface="Calibri"/>
               </a:rPr>
-              <a:t><![CDATA[Sure, here are some suggestions for what to include on each PowerPoint slide:
-Slide 1: Title slide with the lesson title ("Multiplying Mixed Numbers") and any relevant graphics or images
-Slide 2: Objective slide stating the learning objective for the lesson ("Students will be able to multiply mixed numbers accurately.")
-Slide 3: Recap slide with a question prompt asking students to recall their previous knowledge about fractions and how to add and multiply them.
-Slide 4: Teaching slide explaining the steps in multiplying fractions using examples and visual aids.
-Slide 5: Teaching slide providing practical examples of multiplying mixed numbers, such as baking or cooking recipes.
-Slide 6: Teaching slide explaining the steps in multiplying mixed numbers, which involves converting mixed numbers into improper fractions and then multiplying them as usual, with a visual example.
-Slide 7: Practice slide with a worksheet or problem set for students to practice multiplying mixed numbers.
-Slide 8: Practice slide with a real-world scenario for students to apply their knowledge, such as calculating the total area of a rectangular room.
-Slide 9: Exit ticket slide asking students to explain why it's essential to convert mixed numbers to improper fractions before multiplying them.
-Slide 10: Closing slide with any final thoughts or reminders, such as resources for additional practice or homework assignments.]]></a:t>
+              <a:t><![CDATA[Title: Identifying the Main Idea of a Passage
+Learning Objectives:
+- Students will understand the definition of main idea.
+- Students will learn how to identify the main idea in a passage.
+- Students will be able to use context clues and vocabulary words to infer the main idea.
+Starter Activity:
+- Ask students to share their understanding of the term "main idea."
+- Ask students to share any strategies they use to identify the main idea in a passage.
+Worked Examples:
+- Display a short passage on the board or overhead.
+- Read the passage aloud and underline key words and phrases to identify the main idea.
+- Have students work in pairs to read a different passage and identify the main idea together.
+- Discuss the main ideas identified by each pair as a class.
+Practice:
+- Distribute a worksheet to students with several short passages.
+- Instruct students to read each passage and circle the sentence that represents the main idea.
+- Review their answers as a class to identify any common themes or difficulties.
+Exit Ticket:
+- Students will write the main idea of a brief passage on a sticky note and stick it to the board as they exit the classroom.
+Materials needed:
+- Powerpoint presentation with the title and learning objectives included.
+- Short passages for worked examples and practice worksheet.
+- Sticky notes for exit ticket activity.]]></a:t>
             </a:r>
           </a:p>
         </p:txBody>
@@ -305,9 +317,9 @@
 </file>
 
 <file path=ppt/theme/theme1.xml><?xml version="1.0" encoding="utf-8"?>
-<a:theme xmlns:a="http://schemas.openxmlformats.org/drawingml/2006/main" name="Theme76">
+<a:theme xmlns:a="http://schemas.openxmlformats.org/drawingml/2006/main" name="Theme10">
   <a:themeElements>
-    <a:clrScheme name="Theme76">
+    <a:clrScheme name="Theme10">
       <a:dk1>
         <a:sysClr val="windowText" lastClr="000000"/>
       </a:dk1>
@@ -345,7 +357,7 @@
         <a:srgbClr val="800080"/>
       </a:folHlink>
     </a:clrScheme>
-    <a:fontScheme name="Theme76">
+    <a:fontScheme name="Theme10">
       <a:majorFont>
         <a:latin typeface="Calibri"/>
         <a:ea typeface=""/>
@@ -415,7 +427,7 @@
         <a:font script="Uigh" typeface="Microsoft Uighur"/>
       </a:minorFont>
     </a:fontScheme>
-    <a:fmtScheme name="Theme76">
+    <a:fmtScheme name="Theme10">
       <a:fillStyleLst>
         <a:solidFill>
           <a:schemeClr val="phClr"/>

</xml_diff>